<commit_message>
Quick fix på powerpointen
</commit_message>
<xml_diff>
--- a/generalforsamling/22H/Generalforsamling H2022.pptx
+++ b/generalforsamling/22H/Generalforsamling H2022.pptx
@@ -564,18 +564,18 @@
   <pc:docChgLst>
     <pc:chgData name="Peter Hjelle Petersen-Øverleir" userId="75e6a86c-2ff7-48bd-a545-c00c7cd58f36" providerId="ADAL" clId="{32A95EAD-FD7F-4D64-A284-9F163689B806}"/>
     <pc:docChg chg="undo custSel addSld delSld modSld">
-      <pc:chgData name="Peter Hjelle Petersen-Øverleir" userId="75e6a86c-2ff7-48bd-a545-c00c7cd58f36" providerId="ADAL" clId="{32A95EAD-FD7F-4D64-A284-9F163689B806}" dt="2022-11-29T10:14:32.202" v="285" actId="2696"/>
+      <pc:chgData name="Peter Hjelle Petersen-Øverleir" userId="75e6a86c-2ff7-48bd-a545-c00c7cd58f36" providerId="ADAL" clId="{32A95EAD-FD7F-4D64-A284-9F163689B806}" dt="2022-11-29T15:43:44.686" v="328" actId="20577"/>
       <pc:docMkLst>
         <pc:docMk/>
       </pc:docMkLst>
       <pc:sldChg chg="modSp mod">
-        <pc:chgData name="Peter Hjelle Petersen-Øverleir" userId="75e6a86c-2ff7-48bd-a545-c00c7cd58f36" providerId="ADAL" clId="{32A95EAD-FD7F-4D64-A284-9F163689B806}" dt="2022-11-29T10:08:08.727" v="48" actId="20577"/>
+        <pc:chgData name="Peter Hjelle Petersen-Øverleir" userId="75e6a86c-2ff7-48bd-a545-c00c7cd58f36" providerId="ADAL" clId="{32A95EAD-FD7F-4D64-A284-9F163689B806}" dt="2022-11-29T15:43:44.686" v="328" actId="20577"/>
         <pc:sldMkLst>
           <pc:docMk/>
           <pc:sldMk cId="0" sldId="256"/>
         </pc:sldMkLst>
         <pc:spChg chg="mod">
-          <ac:chgData name="Peter Hjelle Petersen-Øverleir" userId="75e6a86c-2ff7-48bd-a545-c00c7cd58f36" providerId="ADAL" clId="{32A95EAD-FD7F-4D64-A284-9F163689B806}" dt="2022-11-29T10:08:08.727" v="48" actId="20577"/>
+          <ac:chgData name="Peter Hjelle Petersen-Øverleir" userId="75e6a86c-2ff7-48bd-a545-c00c7cd58f36" providerId="ADAL" clId="{32A95EAD-FD7F-4D64-A284-9F163689B806}" dt="2022-11-29T15:43:44.686" v="328" actId="20577"/>
           <ac:spMkLst>
             <pc:docMk/>
             <pc:sldMk cId="0" sldId="256"/>
@@ -584,13 +584,13 @@
         </pc:spChg>
       </pc:sldChg>
       <pc:sldChg chg="modSp mod">
-        <pc:chgData name="Peter Hjelle Petersen-Øverleir" userId="75e6a86c-2ff7-48bd-a545-c00c7cd58f36" providerId="ADAL" clId="{32A95EAD-FD7F-4D64-A284-9F163689B806}" dt="2022-11-29T10:10:19.717" v="164" actId="20577"/>
+        <pc:chgData name="Peter Hjelle Petersen-Øverleir" userId="75e6a86c-2ff7-48bd-a545-c00c7cd58f36" providerId="ADAL" clId="{32A95EAD-FD7F-4D64-A284-9F163689B806}" dt="2022-11-29T13:58:23.506" v="306" actId="2710"/>
         <pc:sldMkLst>
           <pc:docMk/>
           <pc:sldMk cId="0" sldId="277"/>
         </pc:sldMkLst>
         <pc:spChg chg="mod">
-          <ac:chgData name="Peter Hjelle Petersen-Øverleir" userId="75e6a86c-2ff7-48bd-a545-c00c7cd58f36" providerId="ADAL" clId="{32A95EAD-FD7F-4D64-A284-9F163689B806}" dt="2022-11-29T10:10:19.717" v="164" actId="20577"/>
+          <ac:chgData name="Peter Hjelle Petersen-Øverleir" userId="75e6a86c-2ff7-48bd-a545-c00c7cd58f36" providerId="ADAL" clId="{32A95EAD-FD7F-4D64-A284-9F163689B806}" dt="2022-11-29T13:58:23.506" v="306" actId="2710"/>
           <ac:spMkLst>
             <pc:docMk/>
             <pc:sldMk cId="0" sldId="277"/>
@@ -598,7 +598,7 @@
           </ac:spMkLst>
         </pc:spChg>
         <pc:spChg chg="mod">
-          <ac:chgData name="Peter Hjelle Petersen-Øverleir" userId="75e6a86c-2ff7-48bd-a545-c00c7cd58f36" providerId="ADAL" clId="{32A95EAD-FD7F-4D64-A284-9F163689B806}" dt="2022-11-29T10:10:10.062" v="156" actId="20577"/>
+          <ac:chgData name="Peter Hjelle Petersen-Øverleir" userId="75e6a86c-2ff7-48bd-a545-c00c7cd58f36" providerId="ADAL" clId="{32A95EAD-FD7F-4D64-A284-9F163689B806}" dt="2022-11-29T13:58:18.395" v="305" actId="2710"/>
           <ac:spMkLst>
             <pc:docMk/>
             <pc:sldMk cId="0" sldId="277"/>
@@ -642,6 +642,21 @@
           <pc:docMk/>
           <pc:sldMk cId="0" sldId="281"/>
         </pc:sldMkLst>
+      </pc:sldChg>
+      <pc:sldChg chg="modSp mod">
+        <pc:chgData name="Peter Hjelle Petersen-Øverleir" userId="75e6a86c-2ff7-48bd-a545-c00c7cd58f36" providerId="ADAL" clId="{32A95EAD-FD7F-4D64-A284-9F163689B806}" dt="2022-11-29T13:54:10.658" v="304" actId="404"/>
+        <pc:sldMkLst>
+          <pc:docMk/>
+          <pc:sldMk cId="2713644708" sldId="286"/>
+        </pc:sldMkLst>
+        <pc:spChg chg="mod">
+          <ac:chgData name="Peter Hjelle Petersen-Øverleir" userId="75e6a86c-2ff7-48bd-a545-c00c7cd58f36" providerId="ADAL" clId="{32A95EAD-FD7F-4D64-A284-9F163689B806}" dt="2022-11-29T13:54:10.658" v="304" actId="404"/>
+          <ac:spMkLst>
+            <pc:docMk/>
+            <pc:sldMk cId="2713644708" sldId="286"/>
+            <ac:spMk id="113" creationId="{00000000-0000-0000-0000-000000000000}"/>
+          </ac:spMkLst>
+        </pc:spChg>
       </pc:sldChg>
       <pc:sldChg chg="modSp mod">
         <pc:chgData name="Peter Hjelle Petersen-Øverleir" userId="75e6a86c-2ff7-48bd-a545-c00c7cd58f36" providerId="ADAL" clId="{32A95EAD-FD7F-4D64-A284-9F163689B806}" dt="2022-11-29T10:12:02.280" v="184" actId="20577"/>
@@ -12768,6 +12783,33 @@
               <a:rPr lang="en-GB" dirty="0"/>
               <a:t>(29. November 2022)</a:t>
             </a:r>
+          </a:p>
+          <a:p>
+            <a:pPr marL="0" lvl="0" indent="0" algn="ctr" rtl="0">
+              <a:spcBef>
+                <a:spcPts val="0"/>
+              </a:spcBef>
+              <a:spcAft>
+                <a:spcPts val="0"/>
+              </a:spcAft>
+              <a:buNone/>
+            </a:pPr>
+            <a:endParaRPr lang="en-GB" dirty="0"/>
+          </a:p>
+          <a:p>
+            <a:pPr marL="0" lvl="0" indent="0" algn="ctr" rtl="0">
+              <a:spcBef>
+                <a:spcPts val="0"/>
+              </a:spcBef>
+              <a:spcAft>
+                <a:spcPts val="0"/>
+              </a:spcAft>
+              <a:buNone/>
+            </a:pPr>
+            <a:r>
+              <a:rPr lang="en-GB" dirty="0"/>
+              <a:t>DAGSORDEN: gf.cyb.no</a:t>
+            </a:r>
             <a:endParaRPr dirty="0"/>
           </a:p>
         </p:txBody>
@@ -13072,8 +13114,8 @@
               <a:buNone/>
             </a:pPr>
             <a:r>
-              <a:rPr lang="nb-NO"/>
-              <a:t>Kasserer orienterer om økonomi</a:t>
+              <a:rPr lang="nb-NO" sz="3200" dirty="0"/>
+              <a:t>Økonomiansvarlig orienterer om økonomi</a:t>
             </a:r>
           </a:p>
         </p:txBody>
@@ -13309,7 +13351,7 @@
               <a:buNone/>
             </a:pPr>
             <a:r>
-              <a:rPr lang="nb-NO">
+              <a:rPr lang="nb-NO" dirty="0">
                 <a:solidFill>
                   <a:schemeClr val="tx1"/>
                 </a:solidFill>
@@ -13366,6 +13408,9 @@
           </a:p>
           <a:p>
             <a:pPr marL="457200" lvl="0" indent="-342900" algn="l" rtl="0">
+              <a:lnSpc>
+                <a:spcPct val="150000"/>
+              </a:lnSpc>
               <a:spcBef>
                 <a:spcPts val="0"/>
               </a:spcBef>
@@ -13386,6 +13431,9 @@
           </a:p>
           <a:p>
             <a:pPr marL="457200" lvl="0" indent="-342900" algn="l" rtl="0">
+              <a:lnSpc>
+                <a:spcPct val="150000"/>
+              </a:lnSpc>
               <a:spcBef>
                 <a:spcPts val="0"/>
               </a:spcBef>
@@ -13406,6 +13454,9 @@
           </a:p>
           <a:p>
             <a:pPr marL="457200" lvl="0" indent="-342900" algn="l" rtl="0">
+              <a:lnSpc>
+                <a:spcPct val="150000"/>
+              </a:lnSpc>
               <a:spcBef>
                 <a:spcPts val="0"/>
               </a:spcBef>
@@ -13426,6 +13477,9 @@
           </a:p>
           <a:p>
             <a:pPr marL="457200" lvl="0" indent="-342900" algn="l" rtl="0">
+              <a:lnSpc>
+                <a:spcPct val="150000"/>
+              </a:lnSpc>
               <a:spcBef>
                 <a:spcPts val="0"/>
               </a:spcBef>
@@ -13446,6 +13500,9 @@
           </a:p>
           <a:p>
             <a:pPr marL="457200" lvl="0" indent="-342900" algn="l" rtl="0">
+              <a:lnSpc>
+                <a:spcPct val="150000"/>
+              </a:lnSpc>
               <a:spcBef>
                 <a:spcPts val="0"/>
               </a:spcBef>
@@ -13466,6 +13523,9 @@
           </a:p>
           <a:p>
             <a:pPr marL="457200" lvl="0" indent="-342900" algn="l" rtl="0">
+              <a:lnSpc>
+                <a:spcPct val="150000"/>
+              </a:lnSpc>
               <a:spcBef>
                 <a:spcPts val="0"/>
               </a:spcBef>
@@ -13486,6 +13546,9 @@
           </a:p>
           <a:p>
             <a:pPr marL="457200" lvl="0" indent="-342900" algn="l" rtl="0">
+              <a:lnSpc>
+                <a:spcPct val="150000"/>
+              </a:lnSpc>
               <a:spcBef>
                 <a:spcPts val="0"/>
               </a:spcBef>
@@ -13554,6 +13617,9 @@
           </a:p>
           <a:p>
             <a:pPr marL="457200" lvl="0" indent="-342900" algn="l" rtl="0">
+              <a:lnSpc>
+                <a:spcPct val="150000"/>
+              </a:lnSpc>
               <a:spcBef>
                 <a:spcPts val="0"/>
               </a:spcBef>
@@ -13574,6 +13640,9 @@
           </a:p>
           <a:p>
             <a:pPr marL="457200" lvl="0" indent="-342900" algn="l" rtl="0">
+              <a:lnSpc>
+                <a:spcPct val="150000"/>
+              </a:lnSpc>
               <a:spcBef>
                 <a:spcPts val="0"/>
               </a:spcBef>
@@ -13594,6 +13663,9 @@
           </a:p>
           <a:p>
             <a:pPr marL="457200" lvl="0" indent="-342900" algn="l" rtl="0">
+              <a:lnSpc>
+                <a:spcPct val="150000"/>
+              </a:lnSpc>
               <a:spcBef>
                 <a:spcPts val="0"/>
               </a:spcBef>
@@ -13614,6 +13686,9 @@
           </a:p>
           <a:p>
             <a:pPr marL="457200" lvl="0" indent="-342900" algn="l" rtl="0">
+              <a:lnSpc>
+                <a:spcPct val="150000"/>
+              </a:lnSpc>
               <a:spcBef>
                 <a:spcPts val="0"/>
               </a:spcBef>
@@ -13634,6 +13709,9 @@
           </a:p>
           <a:p>
             <a:pPr marL="457200" lvl="0" indent="-342900" algn="l" rtl="0">
+              <a:lnSpc>
+                <a:spcPct val="150000"/>
+              </a:lnSpc>
               <a:spcBef>
                 <a:spcPts val="0"/>
               </a:spcBef>
@@ -13654,6 +13732,9 @@
           </a:p>
           <a:p>
             <a:pPr marL="457200" lvl="0" indent="-342900" algn="l" rtl="0">
+              <a:lnSpc>
+                <a:spcPct val="150000"/>
+              </a:lnSpc>
               <a:spcBef>
                 <a:spcPts val="0"/>
               </a:spcBef>
@@ -13690,6 +13771,9 @@
           </a:p>
           <a:p>
             <a:pPr marL="457200" lvl="0" indent="-342900" algn="l" rtl="0">
+              <a:lnSpc>
+                <a:spcPct val="150000"/>
+              </a:lnSpc>
               <a:spcBef>
                 <a:spcPts val="0"/>
               </a:spcBef>
@@ -13710,6 +13794,9 @@
           </a:p>
           <a:p>
             <a:pPr marL="457200" lvl="0" indent="-342900" algn="l" rtl="0">
+              <a:lnSpc>
+                <a:spcPct val="150000"/>
+              </a:lnSpc>
               <a:spcBef>
                 <a:spcPts val="0"/>
               </a:spcBef>
@@ -13738,6 +13825,9 @@
           </a:p>
           <a:p>
             <a:pPr marL="457200" lvl="0" indent="-342900" algn="l" rtl="0">
+              <a:lnSpc>
+                <a:spcPct val="150000"/>
+              </a:lnSpc>
               <a:spcBef>
                 <a:spcPts val="0"/>
               </a:spcBef>

</xml_diff>